<commit_message>
Updated presentation slides, still not complete
</commit_message>
<xml_diff>
--- a/Documentation/8-Presentation/Capstone.pptx
+++ b/Documentation/8-Presentation/Capstone.pptx
@@ -3987,6 +3987,36 @@
           </a:p>
         </p:txBody>
       </p:sp>
+      <p:pic>
+        <p:nvPicPr>
+          <p:cNvPr id="3" name="Picture 2"/>
+          <p:cNvPicPr>
+            <a:picLocks noChangeAspect="1"/>
+          </p:cNvPicPr>
+          <p:nvPr/>
+        </p:nvPicPr>
+        <p:blipFill>
+          <a:blip r:embed="rId2">
+            <a:extLst>
+              <a:ext uri="{28A0092B-C50C-407E-A947-70E740481C1C}">
+                <a14:useLocalDpi xmlns:a14="http://schemas.microsoft.com/office/drawing/2010/main" val="0"/>
+              </a:ext>
+            </a:extLst>
+          </a:blip>
+          <a:stretch>
+            <a:fillRect/>
+          </a:stretch>
+        </p:blipFill>
+        <p:spPr>
+          <a:xfrm>
+            <a:off x="3499696" y="1845734"/>
+            <a:ext cx="5253567" cy="4346193"/>
+          </a:xfrm>
+          <a:prstGeom prst="rect">
+            <a:avLst/>
+          </a:prstGeom>
+        </p:spPr>
+      </p:pic>
     </p:spTree>
     <p:extLst>
       <p:ext uri="{BB962C8B-B14F-4D97-AF65-F5344CB8AC3E}">
@@ -4071,17 +4101,59 @@
               <a:t>Integrate Alfred’s system to existing Point of Sale </a:t>
             </a:r>
             <a:r>
-              <a:rPr lang="en-US" dirty="0"/>
-              <a:t>S</a:t>
-            </a:r>
-            <a:r>
               <a:rPr lang="en-US" dirty="0" smtClean="0"/>
-              <a:t>ystems</a:t>
-            </a:r>
-            <a:endParaRPr lang="en-US" dirty="0"/>
-          </a:p>
-        </p:txBody>
-      </p:sp>
+              <a:t>Systems</a:t>
+            </a:r>
+          </a:p>
+          <a:p>
+            <a:pPr>
+              <a:buFont typeface="Arial" charset="0"/>
+              <a:buChar char="•"/>
+            </a:pPr>
+            <a:r>
+              <a:rPr lang="en-US" dirty="0" smtClean="0"/>
+              <a:t>Upgrading the Dispensing System</a:t>
+            </a:r>
+            <a:endParaRPr lang="en-US" dirty="0"/>
+          </a:p>
+        </p:txBody>
+      </p:sp>
+      <p:pic>
+        <p:nvPicPr>
+          <p:cNvPr id="4" name="Picture 3"/>
+          <p:cNvPicPr>
+            <a:picLocks noChangeAspect="1"/>
+          </p:cNvPicPr>
+          <p:nvPr/>
+        </p:nvPicPr>
+        <p:blipFill>
+          <a:blip r:embed="rId2">
+            <a:extLst>
+              <a:ext uri="{BEBA8EAE-BF5A-486C-A8C5-ECC9F3942E4B}">
+                <a14:imgProps xmlns:a14="http://schemas.microsoft.com/office/drawing/2010/main">
+                  <a14:imgLayer r:embed="rId3">
+                    <a14:imgEffect>
+                      <a14:backgroundRemoval t="9963" b="100000" l="10000" r="90000"/>
+                    </a14:imgEffect>
+                  </a14:imgLayer>
+                </a14:imgProps>
+              </a:ext>
+            </a:extLst>
+          </a:blip>
+          <a:stretch>
+            <a:fillRect/>
+          </a:stretch>
+        </p:blipFill>
+        <p:spPr>
+          <a:xfrm>
+            <a:off x="5217278" y="2022231"/>
+            <a:ext cx="6974722" cy="4308232"/>
+          </a:xfrm>
+          <a:prstGeom prst="rect">
+            <a:avLst/>
+          </a:prstGeom>
+        </p:spPr>
+      </p:pic>
     </p:spTree>
     <p:extLst>
       <p:ext uri="{BB962C8B-B14F-4D97-AF65-F5344CB8AC3E}">
@@ -4426,6 +4498,50 @@
           </a:p>
         </p:txBody>
       </p:sp>
+      <p:sp>
+        <p:nvSpPr>
+          <p:cNvPr id="4" name="Rectangle 3"/>
+          <p:cNvSpPr/>
+          <p:nvPr/>
+        </p:nvSpPr>
+        <p:spPr>
+          <a:xfrm>
+            <a:off x="5404513" y="2165091"/>
+            <a:ext cx="5336275" cy="3384645"/>
+          </a:xfrm>
+          <a:prstGeom prst="rect">
+            <a:avLst/>
+          </a:prstGeom>
+        </p:spPr>
+        <p:style>
+          <a:lnRef idx="2">
+            <a:schemeClr val="accent1">
+              <a:shade val="50000"/>
+            </a:schemeClr>
+          </a:lnRef>
+          <a:fillRef idx="1">
+            <a:schemeClr val="accent1"/>
+          </a:fillRef>
+          <a:effectRef idx="0">
+            <a:schemeClr val="accent1"/>
+          </a:effectRef>
+          <a:fontRef idx="minor">
+            <a:schemeClr val="lt1"/>
+          </a:fontRef>
+        </p:style>
+        <p:txBody>
+          <a:bodyPr rtlCol="0" anchor="ctr"/>
+          <a:lstStyle/>
+          <a:p>
+            <a:pPr algn="ctr"/>
+            <a:r>
+              <a:rPr lang="en-US" dirty="0" smtClean="0"/>
+              <a:t>Picture of Alfred</a:t>
+            </a:r>
+            <a:endParaRPr lang="en-US" dirty="0"/>
+          </a:p>
+        </p:txBody>
+      </p:sp>
     </p:spTree>
     <p:extLst>
       <p:ext uri="{BB962C8B-B14F-4D97-AF65-F5344CB8AC3E}">
@@ -4549,6 +4665,60 @@
           </a:p>
         </p:txBody>
       </p:sp>
+      <p:pic>
+        <p:nvPicPr>
+          <p:cNvPr id="4" name="Picture 3"/>
+          <p:cNvPicPr>
+            <a:picLocks noChangeAspect="1"/>
+          </p:cNvPicPr>
+          <p:nvPr/>
+        </p:nvPicPr>
+        <p:blipFill rotWithShape="1">
+          <a:blip r:embed="rId2">
+            <a:extLst>
+              <a:ext uri="{BEBA8EAE-BF5A-486C-A8C5-ECC9F3942E4B}">
+                <a14:imgProps xmlns:a14="http://schemas.microsoft.com/office/drawing/2010/main">
+                  <a14:imgLayer r:embed="rId3">
+                    <a14:imgEffect>
+                      <a14:backgroundRemoval t="1625" b="92563" l="2684" r="93349">
+                        <a14:foregroundMark x1="36989" y1="21125" x2="36989" y2="21125"/>
+                        <a14:foregroundMark x1="29055" y1="5500" x2="29055" y2="5500"/>
+                        <a14:foregroundMark x1="88915" y1="18438" x2="88915" y2="18438"/>
+                        <a14:foregroundMark x1="57176" y1="86125" x2="57176" y2="86125"/>
+                        <a14:foregroundMark x1="67561" y1="87625" x2="67561" y2="87625"/>
+                        <a14:foregroundMark x1="75729" y1="87625" x2="75729" y2="87625"/>
+                        <a14:foregroundMark x1="84364" y1="87375" x2="84364" y2="87375"/>
+                        <a14:foregroundMark x1="89498" y1="87625" x2="89498" y2="87625"/>
+                        <a14:foregroundMark x1="79930" y1="87625" x2="79930" y2="87625"/>
+                        <a14:foregroundMark x1="87048" y1="87813" x2="87048" y2="87813"/>
+                        <a14:foregroundMark x1="91482" y1="87375" x2="91482" y2="87375"/>
+                        <a14:foregroundMark x1="30805" y1="38625" x2="30805" y2="38625"/>
+                        <a14:foregroundMark x1="33956" y1="37688" x2="33956" y2="37688"/>
+                        <a14:backgroundMark x1="21704" y1="55125" x2="21704" y2="55125"/>
+                        <a14:backgroundMark x1="56009" y1="24750" x2="56009" y2="24750"/>
+                        <a14:backgroundMark x1="56709" y1="25813" x2="56709" y2="25813"/>
+                        <a14:backgroundMark x1="61494" y1="19563" x2="61494" y2="19563"/>
+                        <a14:backgroundMark x1="30455" y1="10938" x2="30455" y2="10938"/>
+                      </a14:backgroundRemoval>
+                    </a14:imgEffect>
+                  </a14:imgLayer>
+                </a14:imgProps>
+              </a:ext>
+            </a:extLst>
+          </a:blip>
+          <a:srcRect b="6539"/>
+          <a:stretch/>
+        </p:blipFill>
+        <p:spPr>
+          <a:xfrm>
+            <a:off x="8174200" y="2021580"/>
+            <a:ext cx="2361591" cy="4120726"/>
+          </a:xfrm>
+          <a:prstGeom prst="rect">
+            <a:avLst/>
+          </a:prstGeom>
+        </p:spPr>
+      </p:pic>
     </p:spTree>
     <p:extLst>
       <p:ext uri="{BB962C8B-B14F-4D97-AF65-F5344CB8AC3E}">
@@ -4844,6 +5014,13 @@
   <p:clrMapOvr>
     <a:masterClrMapping/>
   </p:clrMapOvr>
+  <p:timing>
+    <p:tnLst>
+      <p:par>
+        <p:cTn id="1" dur="indefinite" restart="never" nodeType="tmRoot"/>
+      </p:par>
+    </p:tnLst>
+  </p:timing>
 </p:sld>
 </file>
 
@@ -5213,6 +5390,95 @@
           </a:p>
         </p:txBody>
       </p:sp>
+      <p:pic>
+        <p:nvPicPr>
+          <p:cNvPr id="4" name="Picture 3"/>
+          <p:cNvPicPr>
+            <a:picLocks noChangeAspect="1"/>
+          </p:cNvPicPr>
+          <p:nvPr/>
+        </p:nvPicPr>
+        <p:blipFill>
+          <a:blip r:embed="rId2">
+            <a:extLst>
+              <a:ext uri="{28A0092B-C50C-407E-A947-70E740481C1C}">
+                <a14:useLocalDpi xmlns:a14="http://schemas.microsoft.com/office/drawing/2010/main" val="0"/>
+              </a:ext>
+            </a:extLst>
+          </a:blip>
+          <a:stretch>
+            <a:fillRect/>
+          </a:stretch>
+        </p:blipFill>
+        <p:spPr>
+          <a:xfrm>
+            <a:off x="1097279" y="2210554"/>
+            <a:ext cx="4754709" cy="2661471"/>
+          </a:xfrm>
+          <a:prstGeom prst="rect">
+            <a:avLst/>
+          </a:prstGeom>
+        </p:spPr>
+      </p:pic>
+      <p:pic>
+        <p:nvPicPr>
+          <p:cNvPr id="6" name="Picture 5"/>
+          <p:cNvPicPr>
+            <a:picLocks noChangeAspect="1"/>
+          </p:cNvPicPr>
+          <p:nvPr/>
+        </p:nvPicPr>
+        <p:blipFill rotWithShape="1">
+          <a:blip r:embed="rId3">
+            <a:extLst>
+              <a:ext uri="{28A0092B-C50C-407E-A947-70E740481C1C}">
+                <a14:useLocalDpi xmlns:a14="http://schemas.microsoft.com/office/drawing/2010/main" val="0"/>
+              </a:ext>
+            </a:extLst>
+          </a:blip>
+          <a:srcRect t="9222" b="16194"/>
+          <a:stretch/>
+        </p:blipFill>
+        <p:spPr>
+          <a:xfrm>
+            <a:off x="3113295" y="4768195"/>
+            <a:ext cx="5477387" cy="1569241"/>
+          </a:xfrm>
+          <a:prstGeom prst="rect">
+            <a:avLst/>
+          </a:prstGeom>
+        </p:spPr>
+      </p:pic>
+      <p:pic>
+        <p:nvPicPr>
+          <p:cNvPr id="5" name="Picture 4"/>
+          <p:cNvPicPr>
+            <a:picLocks noChangeAspect="1"/>
+          </p:cNvPicPr>
+          <p:nvPr/>
+        </p:nvPicPr>
+        <p:blipFill>
+          <a:blip r:embed="rId4">
+            <a:extLst>
+              <a:ext uri="{28A0092B-C50C-407E-A947-70E740481C1C}">
+                <a14:useLocalDpi xmlns:a14="http://schemas.microsoft.com/office/drawing/2010/main" val="0"/>
+              </a:ext>
+            </a:extLst>
+          </a:blip>
+          <a:stretch>
+            <a:fillRect/>
+          </a:stretch>
+        </p:blipFill>
+        <p:spPr>
+          <a:xfrm>
+            <a:off x="7082667" y="2210554"/>
+            <a:ext cx="4073013" cy="2665289"/>
+          </a:xfrm>
+          <a:prstGeom prst="rect">
+            <a:avLst/>
+          </a:prstGeom>
+        </p:spPr>
+      </p:pic>
     </p:spTree>
     <p:extLst>
       <p:ext uri="{BB962C8B-B14F-4D97-AF65-F5344CB8AC3E}">

</xml_diff>